<commit_message>
Added Hands On Demos for Days 23 and 24
</commit_message>
<xml_diff>
--- a/5. Spring 5.0/Day 24/Slides/2. Integrating and Using Spring Data REST in an Application/getting-started-slides.pptx
+++ b/5. Spring 5.0/Day 24/Slides/2. Integrating and Using Spring Data REST in an Application/getting-started-slides.pptx
@@ -4715,6 +4715,10 @@
           </p:nvPr>
         </p:nvSpPr>
         <p:spPr>
+          <a:xfrm>
+            <a:off x="888767" y="2936625"/>
+            <a:ext cx="11532235" cy="1869439"/>
+          </a:xfrm>
           <a:prstGeom prst="rect">
             <a:avLst/>
           </a:prstGeom>

</xml_diff>